<commit_message>
fix(docs):  updates docs  for presentation
</commit_message>
<xml_diff>
--- a/docs/TERCEIRA_PPT_LES.pptx
+++ b/docs/TERCEIRA_PPT_LES.pptx
@@ -7347,8 +7347,13 @@
             </a:pPr>
             <a:r>
               <a:rPr lang="pt-BR" altLang="pt-BR" sz="3200" b="1" dirty="0"/>
-              <a:t>ENTREGA – 30/08/2025</a:t>
-            </a:r>
+              <a:t>ENTREGA </a:t>
+            </a:r>
+            <a:r>
+              <a:rPr lang="pt-BR" altLang="pt-BR" sz="3200" b="1"/>
+              <a:t>– 02/09/2025</a:t>
+            </a:r>
+            <a:endParaRPr lang="pt-BR" altLang="pt-BR" sz="3200" b="1" dirty="0"/>
           </a:p>
         </p:txBody>
       </p:sp>

</xml_diff>